<commit_message>
Identity PPT + Sorted/Labeled Dataset
</commit_message>
<xml_diff>
--- a/ChefsenseIdentity.pptx
+++ b/ChefsenseIdentity.pptx
@@ -3290,6 +3290,148 @@
           </p:txBody>
         </p:sp>
       </p:grpSp>
+      <p:grpSp>
+        <p:nvGrpSpPr>
+          <p:cNvPr id="24" name="Group 23"/>
+          <p:cNvGrpSpPr/>
+          <p:nvPr/>
+        </p:nvGrpSpPr>
+        <p:grpSpPr>
+          <a:xfrm>
+            <a:off x="5000291" y="544286"/>
+            <a:ext cx="5733143" cy="5733143"/>
+            <a:chOff x="1723572" y="417286"/>
+            <a:chExt cx="5733143" cy="5733143"/>
+          </a:xfrm>
+        </p:grpSpPr>
+        <p:sp>
+          <p:nvSpPr>
+            <p:cNvPr id="22" name="Rounded Rectangle 21"/>
+            <p:cNvSpPr/>
+            <p:nvPr/>
+          </p:nvSpPr>
+          <p:spPr>
+            <a:xfrm>
+              <a:off x="1723572" y="417286"/>
+              <a:ext cx="5733143" cy="5733143"/>
+            </a:xfrm>
+            <a:prstGeom prst="roundRect">
+              <a:avLst/>
+            </a:prstGeom>
+            <a:solidFill>
+              <a:srgbClr val="F17B33"/>
+            </a:solidFill>
+            <a:ln>
+              <a:noFill/>
+            </a:ln>
+            <a:effectLst/>
+          </p:spPr>
+          <p:style>
+            <a:lnRef idx="1">
+              <a:schemeClr val="accent1"/>
+            </a:lnRef>
+            <a:fillRef idx="3">
+              <a:schemeClr val="accent1"/>
+            </a:fillRef>
+            <a:effectRef idx="2">
+              <a:schemeClr val="accent1"/>
+            </a:effectRef>
+            <a:fontRef idx="minor">
+              <a:schemeClr val="lt1"/>
+            </a:fontRef>
+          </p:style>
+          <p:txBody>
+            <a:bodyPr rtlCol="0" anchor="ctr"/>
+            <a:lstStyle/>
+            <a:p>
+              <a:pPr algn="ctr"/>
+              <a:endParaRPr lang="en-US"/>
+            </a:p>
+          </p:txBody>
+        </p:sp>
+        <p:grpSp>
+          <p:nvGrpSpPr>
+            <p:cNvPr id="23" name="Group 22"/>
+            <p:cNvGrpSpPr/>
+            <p:nvPr/>
+          </p:nvGrpSpPr>
+          <p:grpSpPr>
+            <a:xfrm>
+              <a:off x="2317643" y="1303873"/>
+              <a:ext cx="4639927" cy="3957559"/>
+              <a:chOff x="9311930" y="3096349"/>
+              <a:chExt cx="3986784" cy="3400470"/>
+            </a:xfrm>
+          </p:grpSpPr>
+          <p:pic>
+            <p:nvPicPr>
+              <p:cNvPr id="19" name="Picture 18" descr="newchefsenseprev.png"/>
+              <p:cNvPicPr>
+                <a:picLocks noChangeAspect="1"/>
+              </p:cNvPicPr>
+              <p:nvPr/>
+            </p:nvPicPr>
+            <p:blipFill rotWithShape="1">
+              <a:blip r:embed="rId2">
+                <a:extLst>
+                  <a:ext uri="{BEBA8EAE-BF5A-486C-A8C5-ECC9F3942E4B}">
+                    <a14:imgProps xmlns:a14="http://schemas.microsoft.com/office/drawing/2010/main">
+                      <a14:imgLayer r:embed="rId3">
+                        <a14:imgEffect>
+                          <a14:brightnessContrast bright="-20000" contrast="40000"/>
+                        </a14:imgEffect>
+                      </a14:imgLayer>
+                    </a14:imgProps>
+                  </a:ext>
+                  <a:ext uri="{28A0092B-C50C-407E-A947-70E740481C1C}">
+                    <a14:useLocalDpi xmlns:a14="http://schemas.microsoft.com/office/drawing/2010/main" val="0"/>
+                  </a:ext>
+                </a:extLst>
+              </a:blip>
+              <a:srcRect b="18088"/>
+              <a:stretch/>
+            </p:blipFill>
+            <p:spPr>
+              <a:xfrm>
+                <a:off x="9311930" y="3096349"/>
+                <a:ext cx="3986784" cy="3400470"/>
+              </a:xfrm>
+              <a:prstGeom prst="rect">
+                <a:avLst/>
+              </a:prstGeom>
+            </p:spPr>
+          </p:pic>
+          <p:pic>
+            <p:nvPicPr>
+              <p:cNvPr id="20" name="Picture 19" descr="newchefsenseprev.png"/>
+              <p:cNvPicPr>
+                <a:picLocks noChangeAspect="1"/>
+              </p:cNvPicPr>
+              <p:nvPr/>
+            </p:nvPicPr>
+            <p:blipFill rotWithShape="1">
+              <a:blip r:embed="rId4">
+                <a:extLst>
+                  <a:ext uri="{28A0092B-C50C-407E-A947-70E740481C1C}">
+                    <a14:useLocalDpi xmlns:a14="http://schemas.microsoft.com/office/drawing/2010/main" val="0"/>
+                  </a:ext>
+                </a:extLst>
+              </a:blip>
+              <a:srcRect r="50513" b="18088"/>
+              <a:stretch/>
+            </p:blipFill>
+            <p:spPr>
+              <a:xfrm>
+                <a:off x="9311930" y="3096349"/>
+                <a:ext cx="1972927" cy="3400470"/>
+              </a:xfrm>
+              <a:prstGeom prst="rect">
+                <a:avLst/>
+              </a:prstGeom>
+            </p:spPr>
+          </p:pic>
+        </p:grpSp>
+      </p:grpSp>
     </p:spTree>
     <p:extLst>
       <p:ext uri="{BB962C8B-B14F-4D97-AF65-F5344CB8AC3E}">

</xml_diff>